<commit_message>
Open and closing modifications
</commit_message>
<xml_diff>
--- a/MOMM/February 2024.pptx
+++ b/MOMM/February 2024.pptx
@@ -2908,6 +2908,42 @@
         </a:p>
       </dgm:t>
     </dgm:pt>
+    <dgm:pt modelId="{92AA2AF9-7688-4C06-999B-0FC944B9027C}">
+      <dgm:prSet/>
+      <dgm:spPr/>
+      <dgm:t>
+        <a:bodyPr/>
+        <a:lstStyle/>
+        <a:p>
+          <a:r>
+            <a:rPr lang="en-IN" dirty="0"/>
+            <a:t>Fake Data Generator</a:t>
+          </a:r>
+        </a:p>
+      </dgm:t>
+    </dgm:pt>
+    <dgm:pt modelId="{F5DFCEBC-5316-4FF2-B608-9A54F63E402A}" type="parTrans" cxnId="{74DD48E5-CF61-4F92-969F-A024C07FDE37}">
+      <dgm:prSet/>
+      <dgm:spPr/>
+      <dgm:t>
+        <a:bodyPr/>
+        <a:lstStyle/>
+        <a:p>
+          <a:endParaRPr lang="en-IN"/>
+        </a:p>
+      </dgm:t>
+    </dgm:pt>
+    <dgm:pt modelId="{AC94ECC2-9398-4DDD-9AE6-80025E068A59}" type="sibTrans" cxnId="{74DD48E5-CF61-4F92-969F-A024C07FDE37}">
+      <dgm:prSet/>
+      <dgm:spPr/>
+      <dgm:t>
+        <a:bodyPr/>
+        <a:lstStyle/>
+        <a:p>
+          <a:endParaRPr lang="en-IN"/>
+        </a:p>
+      </dgm:t>
+    </dgm:pt>
     <dgm:pt modelId="{6FA4A374-D50E-4B56-B685-C2A749DFBC8E}" type="pres">
       <dgm:prSet presAssocID="{CC2AB139-7FE8-4288-BC7C-7E41A791ED35}" presName="linear" presStyleCnt="0">
         <dgm:presLayoutVars>
@@ -2973,8 +3009,10 @@
     <dgm:cxn modelId="{7A96F1D8-929B-431F-9EF2-40388BB032FF}" srcId="{C5EE516E-14D3-4875-B7E8-A6D30754EAE4}" destId="{651C7012-AF3A-4989-81DD-7429956DC37D}" srcOrd="0" destOrd="0" parTransId="{A9D441C6-FD30-4609-B4ED-4A0F8F3075C0}" sibTransId="{488E79D7-F2B3-4F2F-80CC-B8316FC7E0B9}"/>
     <dgm:cxn modelId="{FFD0F6E3-761C-4223-BD58-C44D9016A2EE}" srcId="{C5EE516E-14D3-4875-B7E8-A6D30754EAE4}" destId="{EA7D01D2-B47C-4C94-8BFC-00F7D125AF74}" srcOrd="4" destOrd="0" parTransId="{E1BA3B4D-7809-48CB-BC13-827C48EE1B04}" sibTransId="{8E82E543-A5D7-4D68-9F1A-59726CB44198}"/>
     <dgm:cxn modelId="{0F6507E5-9567-4E24-B2EB-3701FC46D8AC}" srcId="{F7CD7B6E-5AA9-4F6A-900B-9621AE939C9F}" destId="{0B4A69DE-C091-405D-A4AE-D5CA6424C3E6}" srcOrd="0" destOrd="0" parTransId="{E1CC1084-E474-4148-938D-4D258BFA1E82}" sibTransId="{DCFC8164-077A-4A96-8E16-1D97466CC317}"/>
+    <dgm:cxn modelId="{74DD48E5-CF61-4F92-969F-A024C07FDE37}" srcId="{F7CD7B6E-5AA9-4F6A-900B-9621AE939C9F}" destId="{92AA2AF9-7688-4C06-999B-0FC944B9027C}" srcOrd="4" destOrd="0" parTransId="{F5DFCEBC-5316-4FF2-B608-9A54F63E402A}" sibTransId="{AC94ECC2-9398-4DDD-9AE6-80025E068A59}"/>
     <dgm:cxn modelId="{EFF5F8EC-CB10-4E1F-8329-9FE761E001B0}" srcId="{C5EE516E-14D3-4875-B7E8-A6D30754EAE4}" destId="{ACE89B0F-8D7C-43DE-929C-F35BD299C791}" srcOrd="5" destOrd="0" parTransId="{C5C02146-8DEA-4C89-B4C2-7F22AA9E0AD1}" sibTransId="{DE6041B4-990F-4455-8EF8-53B9C8A4FB97}"/>
     <dgm:cxn modelId="{C7A2D8F8-3735-4B86-8E81-ADE1C81755C8}" type="presOf" srcId="{3CD3AF3E-8208-4793-873C-89BFDCE6D127}" destId="{AFAB8BB1-9E2E-4852-AF4C-4CF7A05E241E}" srcOrd="0" destOrd="1" presId="urn:microsoft.com/office/officeart/2005/8/layout/vList2"/>
+    <dgm:cxn modelId="{1E82E4FA-38EE-4FBA-BFDF-9E857DB513C2}" type="presOf" srcId="{92AA2AF9-7688-4C06-999B-0FC944B9027C}" destId="{4C375CD4-3F0C-43CD-A15A-D89820AE4326}" srcOrd="0" destOrd="4" presId="urn:microsoft.com/office/officeart/2005/8/layout/vList2"/>
     <dgm:cxn modelId="{2C57F2FA-D373-4280-9837-0DA659798C52}" type="presOf" srcId="{140FD45C-06D3-4702-A8F0-EC45E4547704}" destId="{AFAB8BB1-9E2E-4852-AF4C-4CF7A05E241E}" srcOrd="0" destOrd="3" presId="urn:microsoft.com/office/officeart/2005/8/layout/vList2"/>
     <dgm:cxn modelId="{8DBE7DFC-C894-40C7-96C9-46FF7A9B7431}" type="presOf" srcId="{2F21BF37-4921-457A-A8E0-2E90943CCE53}" destId="{AFAB8BB1-9E2E-4852-AF4C-4CF7A05E241E}" srcOrd="0" destOrd="2" presId="urn:microsoft.com/office/officeart/2005/8/layout/vList2"/>
     <dgm:cxn modelId="{D1B0DAFE-581C-483D-BD7E-BF415F6B8C8B}" type="presOf" srcId="{66031F3D-B7B7-4D80-80F0-478F08B3774A}" destId="{4C375CD4-3F0C-43CD-A15A-D89820AE4326}" srcOrd="0" destOrd="1" presId="urn:microsoft.com/office/officeart/2005/8/layout/vList2"/>
@@ -3506,8 +3544,8 @@
       </dsp:nvSpPr>
       <dsp:spPr>
         <a:xfrm>
-          <a:off x="0" y="5126"/>
-          <a:ext cx="5285142" cy="327600"/>
+          <a:off x="0" y="38876"/>
+          <a:ext cx="5285142" cy="304200"/>
         </a:xfrm>
         <a:prstGeom prst="roundRect">
           <a:avLst/>
@@ -3548,12 +3586,12 @@
         </a:fontRef>
       </dsp:style>
       <dsp:txBody>
-        <a:bodyPr spcFirstLastPara="0" vert="horz" wrap="square" lIns="53340" tIns="53340" rIns="53340" bIns="53340" numCol="1" spcCol="1270" anchor="ctr" anchorCtr="0">
+        <a:bodyPr spcFirstLastPara="0" vert="horz" wrap="square" lIns="49530" tIns="49530" rIns="49530" bIns="49530" numCol="1" spcCol="1270" anchor="ctr" anchorCtr="0">
           <a:noAutofit/>
         </a:bodyPr>
         <a:lstStyle/>
         <a:p>
-          <a:pPr marL="0" lvl="0" indent="0" algn="l" defTabSz="622300">
+          <a:pPr marL="0" lvl="0" indent="0" algn="l" defTabSz="577850">
             <a:lnSpc>
               <a:spcPct val="90000"/>
             </a:lnSpc>
@@ -3566,15 +3604,15 @@
             <a:buNone/>
           </a:pPr>
           <a:r>
-            <a:rPr lang="en-IN" sz="1400" b="0" i="0" kern="1200"/>
+            <a:rPr lang="en-IN" sz="1300" b="0" i="0" kern="1200"/>
             <a:t>3. Asp.net Core MVC</a:t>
           </a:r>
-          <a:endParaRPr lang="en-IN" sz="1400" kern="1200"/>
+          <a:endParaRPr lang="en-IN" sz="1300" kern="1200"/>
         </a:p>
       </dsp:txBody>
       <dsp:txXfrm>
-        <a:off x="15992" y="21118"/>
-        <a:ext cx="5253158" cy="295616"/>
+        <a:off x="14850" y="53726"/>
+        <a:ext cx="5255442" cy="274500"/>
       </dsp:txXfrm>
     </dsp:sp>
     <dsp:sp modelId="{AFAB8BB1-9E2E-4852-AF4C-4CF7A05E241E}">
@@ -3584,8 +3622,8 @@
       </dsp:nvSpPr>
       <dsp:spPr>
         <a:xfrm>
-          <a:off x="0" y="332726"/>
-          <a:ext cx="5285142" cy="1072260"/>
+          <a:off x="0" y="343076"/>
+          <a:ext cx="5285142" cy="968760"/>
         </a:xfrm>
         <a:prstGeom prst="rect">
           <a:avLst/>
@@ -3609,12 +3647,12 @@
         <a:fontRef idx="minor"/>
       </dsp:style>
       <dsp:txBody>
-        <a:bodyPr spcFirstLastPara="0" vert="horz" wrap="square" lIns="167803" tIns="17780" rIns="99568" bIns="17780" numCol="1" spcCol="1270" anchor="t" anchorCtr="0">
+        <a:bodyPr spcFirstLastPara="0" vert="horz" wrap="square" lIns="167803" tIns="16510" rIns="92456" bIns="16510" numCol="1" spcCol="1270" anchor="t" anchorCtr="0">
           <a:noAutofit/>
         </a:bodyPr>
         <a:lstStyle/>
         <a:p>
-          <a:pPr marL="57150" lvl="1" indent="-57150" algn="l" defTabSz="488950">
+          <a:pPr marL="57150" lvl="1" indent="-57150" algn="l" defTabSz="444500">
             <a:lnSpc>
               <a:spcPct val="90000"/>
             </a:lnSpc>
@@ -3627,13 +3665,13 @@
             <a:buChar char="•"/>
           </a:pPr>
           <a:r>
-            <a:rPr lang="en-IN" sz="1100" b="0" i="0" kern="1200"/>
+            <a:rPr lang="en-IN" sz="1000" b="0" i="0" kern="1200"/>
             <a:t>Folder Structure</a:t>
           </a:r>
-          <a:endParaRPr lang="en-IN" sz="1100" kern="1200"/>
+          <a:endParaRPr lang="en-IN" sz="1000" kern="1200"/>
         </a:p>
         <a:p>
-          <a:pPr marL="57150" lvl="1" indent="-57150" algn="l" defTabSz="488950">
+          <a:pPr marL="57150" lvl="1" indent="-57150" algn="l" defTabSz="444500">
             <a:lnSpc>
               <a:spcPct val="90000"/>
             </a:lnSpc>
@@ -3646,13 +3684,13 @@
             <a:buChar char="•"/>
           </a:pPr>
           <a:r>
-            <a:rPr lang="en-IN" sz="1100" b="0" i="0" kern="1200"/>
+            <a:rPr lang="en-IN" sz="1000" b="0" i="0" kern="1200"/>
             <a:t>View Types (_ViewStart, _ViewImport, Partial, Layout)</a:t>
           </a:r>
-          <a:endParaRPr lang="en-IN" sz="1100" kern="1200"/>
+          <a:endParaRPr lang="en-IN" sz="1000" kern="1200"/>
         </a:p>
         <a:p>
-          <a:pPr marL="57150" lvl="1" indent="-57150" algn="l" defTabSz="488950">
+          <a:pPr marL="57150" lvl="1" indent="-57150" algn="l" defTabSz="444500">
             <a:lnSpc>
               <a:spcPct val="90000"/>
             </a:lnSpc>
@@ -3665,13 +3703,13 @@
             <a:buChar char="•"/>
           </a:pPr>
           <a:r>
-            <a:rPr lang="en-IN" sz="1100" b="0" i="0" kern="1200"/>
+            <a:rPr lang="en-IN" sz="1000" b="0" i="0" kern="1200"/>
             <a:t>Entity Framework</a:t>
           </a:r>
-          <a:endParaRPr lang="en-IN" sz="1100" kern="1200"/>
+          <a:endParaRPr lang="en-IN" sz="1000" kern="1200"/>
         </a:p>
         <a:p>
-          <a:pPr marL="57150" lvl="1" indent="-57150" algn="l" defTabSz="488950">
+          <a:pPr marL="57150" lvl="1" indent="-57150" algn="l" defTabSz="444500">
             <a:lnSpc>
               <a:spcPct val="90000"/>
             </a:lnSpc>
@@ -3684,13 +3722,13 @@
             <a:buChar char="•"/>
           </a:pPr>
           <a:r>
-            <a:rPr lang="en-IN" sz="1100" b="0" i="0" kern="1200"/>
+            <a:rPr lang="en-IN" sz="1000" b="0" i="0" kern="1200"/>
             <a:t>Identity Framework (User, Roles, Claims, etc.)</a:t>
           </a:r>
-          <a:endParaRPr lang="en-IN" sz="1100" kern="1200"/>
+          <a:endParaRPr lang="en-IN" sz="1000" kern="1200"/>
         </a:p>
         <a:p>
-          <a:pPr marL="57150" lvl="1" indent="-57150" algn="l" defTabSz="488950">
+          <a:pPr marL="57150" lvl="1" indent="-57150" algn="l" defTabSz="444500">
             <a:lnSpc>
               <a:spcPct val="90000"/>
             </a:lnSpc>
@@ -3703,13 +3741,13 @@
             <a:buChar char="•"/>
           </a:pPr>
           <a:r>
-            <a:rPr lang="en-IN" sz="1100" b="0" i="0" kern="1200"/>
+            <a:rPr lang="en-IN" sz="1000" b="0" i="0" kern="1200"/>
             <a:t>IdentityUser, IdentityRole</a:t>
           </a:r>
-          <a:endParaRPr lang="en-IN" sz="1100" kern="1200"/>
+          <a:endParaRPr lang="en-IN" sz="1000" kern="1200"/>
         </a:p>
         <a:p>
-          <a:pPr marL="57150" lvl="1" indent="-57150" algn="l" defTabSz="488950">
+          <a:pPr marL="57150" lvl="1" indent="-57150" algn="l" defTabSz="444500">
             <a:lnSpc>
               <a:spcPct val="90000"/>
             </a:lnSpc>
@@ -3722,15 +3760,15 @@
             <a:buChar char="•"/>
           </a:pPr>
           <a:r>
-            <a:rPr lang="en-IN" sz="1100" b="0" i="0" kern="1200"/>
+            <a:rPr lang="en-IN" sz="1000" b="0" i="0" kern="1200"/>
             <a:t>UserManager, SignInManager, RoleManager</a:t>
           </a:r>
-          <a:endParaRPr lang="en-IN" sz="1100" kern="1200"/>
+          <a:endParaRPr lang="en-IN" sz="1000" kern="1200"/>
         </a:p>
       </dsp:txBody>
       <dsp:txXfrm>
-        <a:off x="0" y="332726"/>
-        <a:ext cx="5285142" cy="1072260"/>
+        <a:off x="0" y="343076"/>
+        <a:ext cx="5285142" cy="968760"/>
       </dsp:txXfrm>
     </dsp:sp>
     <dsp:sp modelId="{413A614C-2F80-4C62-8A65-CE9C39323F64}">
@@ -3740,8 +3778,8 @@
       </dsp:nvSpPr>
       <dsp:spPr>
         <a:xfrm>
-          <a:off x="0" y="1404986"/>
-          <a:ext cx="5285142" cy="327600"/>
+          <a:off x="0" y="1311836"/>
+          <a:ext cx="5285142" cy="304200"/>
         </a:xfrm>
         <a:prstGeom prst="roundRect">
           <a:avLst/>
@@ -3782,12 +3820,12 @@
         </a:fontRef>
       </dsp:style>
       <dsp:txBody>
-        <a:bodyPr spcFirstLastPara="0" vert="horz" wrap="square" lIns="53340" tIns="53340" rIns="53340" bIns="53340" numCol="1" spcCol="1270" anchor="ctr" anchorCtr="0">
+        <a:bodyPr spcFirstLastPara="0" vert="horz" wrap="square" lIns="49530" tIns="49530" rIns="49530" bIns="49530" numCol="1" spcCol="1270" anchor="ctr" anchorCtr="0">
           <a:noAutofit/>
         </a:bodyPr>
         <a:lstStyle/>
         <a:p>
-          <a:pPr marL="0" lvl="0" indent="0" algn="l" defTabSz="622300">
+          <a:pPr marL="0" lvl="0" indent="0" algn="l" defTabSz="577850">
             <a:lnSpc>
               <a:spcPct val="90000"/>
             </a:lnSpc>
@@ -3800,15 +3838,15 @@
             <a:buNone/>
           </a:pPr>
           <a:r>
-            <a:rPr lang="en-IN" sz="1400" b="0" i="0" kern="1200"/>
+            <a:rPr lang="en-IN" sz="1300" b="0" i="0" kern="1200"/>
             <a:t>4. Extra</a:t>
           </a:r>
-          <a:endParaRPr lang="en-IN" sz="1400" kern="1200"/>
+          <a:endParaRPr lang="en-IN" sz="1300" kern="1200"/>
         </a:p>
       </dsp:txBody>
       <dsp:txXfrm>
-        <a:off x="15992" y="1420978"/>
-        <a:ext cx="5253158" cy="295616"/>
+        <a:off x="14850" y="1326686"/>
+        <a:ext cx="5255442" cy="274500"/>
       </dsp:txXfrm>
     </dsp:sp>
     <dsp:sp modelId="{4C375CD4-3F0C-43CD-A15A-D89820AE4326}">
@@ -3818,8 +3856,8 @@
       </dsp:nvSpPr>
       <dsp:spPr>
         <a:xfrm>
-          <a:off x="0" y="1732586"/>
-          <a:ext cx="5285142" cy="724500"/>
+          <a:off x="0" y="1616036"/>
+          <a:ext cx="5285142" cy="807300"/>
         </a:xfrm>
         <a:prstGeom prst="rect">
           <a:avLst/>
@@ -3843,12 +3881,12 @@
         <a:fontRef idx="minor"/>
       </dsp:style>
       <dsp:txBody>
-        <a:bodyPr spcFirstLastPara="0" vert="horz" wrap="square" lIns="167803" tIns="17780" rIns="99568" bIns="17780" numCol="1" spcCol="1270" anchor="t" anchorCtr="0">
+        <a:bodyPr spcFirstLastPara="0" vert="horz" wrap="square" lIns="167803" tIns="16510" rIns="92456" bIns="16510" numCol="1" spcCol="1270" anchor="t" anchorCtr="0">
           <a:noAutofit/>
         </a:bodyPr>
         <a:lstStyle/>
         <a:p>
-          <a:pPr marL="57150" lvl="1" indent="-57150" algn="l" defTabSz="488950">
+          <a:pPr marL="57150" lvl="1" indent="-57150" algn="l" defTabSz="444500">
             <a:lnSpc>
               <a:spcPct val="90000"/>
             </a:lnSpc>
@@ -3861,13 +3899,13 @@
             <a:buChar char="•"/>
           </a:pPr>
           <a:r>
-            <a:rPr lang="en-IN" sz="1100" b="0" i="0" kern="1200"/>
+            <a:rPr lang="en-IN" sz="1000" b="0" i="0" kern="1200"/>
             <a:t>FactoHR, Instagram, Flipkart, cookies workflow etc.</a:t>
           </a:r>
-          <a:endParaRPr lang="en-IN" sz="1100" kern="1200"/>
+          <a:endParaRPr lang="en-IN" sz="1000" kern="1200"/>
         </a:p>
         <a:p>
-          <a:pPr marL="57150" lvl="1" indent="-57150" algn="l" defTabSz="488950">
+          <a:pPr marL="57150" lvl="1" indent="-57150" algn="l" defTabSz="444500">
             <a:lnSpc>
               <a:spcPct val="90000"/>
             </a:lnSpc>
@@ -3880,13 +3918,13 @@
             <a:buChar char="•"/>
           </a:pPr>
           <a:r>
-            <a:rPr lang="en-IN" sz="1100" b="0" i="0" kern="1200" dirty="0"/>
+            <a:rPr lang="en-IN" sz="1000" b="0" i="0" kern="1200" dirty="0"/>
             <a:t>Result Getter</a:t>
           </a:r>
-          <a:endParaRPr lang="en-IN" sz="1100" kern="1200" dirty="0"/>
+          <a:endParaRPr lang="en-IN" sz="1000" kern="1200" dirty="0"/>
         </a:p>
         <a:p>
-          <a:pPr marL="57150" lvl="1" indent="-57150" algn="l" defTabSz="488950">
+          <a:pPr marL="57150" lvl="1" indent="-57150" algn="l" defTabSz="444500">
             <a:lnSpc>
               <a:spcPct val="90000"/>
             </a:lnSpc>
@@ -3899,12 +3937,12 @@
             <a:buChar char="•"/>
           </a:pPr>
           <a:r>
-            <a:rPr lang="en-IN" sz="1100" kern="1200" dirty="0"/>
+            <a:rPr lang="en-IN" sz="1000" kern="1200" dirty="0"/>
             <a:t>Firebase</a:t>
           </a:r>
         </a:p>
         <a:p>
-          <a:pPr marL="57150" lvl="1" indent="-57150" algn="l" defTabSz="488950">
+          <a:pPr marL="57150" lvl="1" indent="-57150" algn="l" defTabSz="444500">
             <a:lnSpc>
               <a:spcPct val="90000"/>
             </a:lnSpc>
@@ -3917,14 +3955,32 @@
             <a:buChar char="•"/>
           </a:pPr>
           <a:r>
-            <a:rPr lang="en-IN" sz="1100" kern="1200" dirty="0"/>
+            <a:rPr lang="en-IN" sz="1000" kern="1200" dirty="0"/>
             <a:t>Problem solving question</a:t>
+          </a:r>
+        </a:p>
+        <a:p>
+          <a:pPr marL="57150" lvl="1" indent="-57150" algn="l" defTabSz="444500">
+            <a:lnSpc>
+              <a:spcPct val="90000"/>
+            </a:lnSpc>
+            <a:spcBef>
+              <a:spcPct val="0"/>
+            </a:spcBef>
+            <a:spcAft>
+              <a:spcPct val="20000"/>
+            </a:spcAft>
+            <a:buChar char="•"/>
+          </a:pPr>
+          <a:r>
+            <a:rPr lang="en-IN" sz="1000" kern="1200" dirty="0"/>
+            <a:t>Fake Data Generator</a:t>
           </a:r>
         </a:p>
       </dsp:txBody>
       <dsp:txXfrm>
-        <a:off x="0" y="1732586"/>
-        <a:ext cx="5285142" cy="724500"/>
+        <a:off x="0" y="1616036"/>
+        <a:ext cx="5285142" cy="807300"/>
       </dsp:txXfrm>
     </dsp:sp>
   </dsp:spTree>
@@ -11664,7 +11720,7 @@
           <p:nvPr>
             <p:extLst>
               <p:ext uri="{D42A27DB-BD31-4B8C-83A1-F6EECF244321}">
-                <p14:modId xmlns:p14="http://schemas.microsoft.com/office/powerpoint/2010/main" val="2341152150"/>
+                <p14:modId xmlns:p14="http://schemas.microsoft.com/office/powerpoint/2010/main" val="1232598274"/>
               </p:ext>
             </p:extLst>
           </p:nvPr>
@@ -12661,6 +12717,12 @@
 </file>
 
 <file path=customXml/item1.xml><?xml version="1.0" encoding="utf-8"?>
+<p:properties xmlns:p="http://schemas.microsoft.com/office/2006/metadata/properties" xmlns:xsi="http://www.w3.org/2001/XMLSchema-instance" xmlns:pc="http://schemas.microsoft.com/office/infopath/2007/PartnerControls">
+  <documentManagement/>
+</p:properties>
+</file>
+
+<file path=customXml/item2.xml><?xml version="1.0" encoding="utf-8"?>
 <ct:contentTypeSchema xmlns:ct="http://schemas.microsoft.com/office/2006/metadata/contentType" xmlns:ma="http://schemas.microsoft.com/office/2006/metadata/properties/metaAttributes" ct:_="" ma:_="" ma:contentTypeName="Document" ma:contentTypeID="0x010100840DD400F68D344DBB68745F7FBBD1C9" ma:contentTypeVersion="4" ma:contentTypeDescription="Create a new document." ma:contentTypeScope="" ma:versionID="88f6b5a73431783e558207c167928e37">
   <xsd:schema xmlns:xsd="http://www.w3.org/2001/XMLSchema" xmlns:xs="http://www.w3.org/2001/XMLSchema" xmlns:p="http://schemas.microsoft.com/office/2006/metadata/properties" xmlns:ns2="0e503f2a-cab1-4c45-91d3-ac7b1ae47bc0" xmlns:ns3="36d15805-55ee-4528-8ca3-5f15fb64af31" targetNamespace="http://schemas.microsoft.com/office/2006/metadata/properties" ma:root="true" ma:fieldsID="83f02e8e2f56c7c7f438ebd55648c943" ns2:_="" ns3:_="">
     <xsd:import namespace="0e503f2a-cab1-4c45-91d3-ac7b1ae47bc0"/>
@@ -12825,12 +12887,6 @@
 </ct:contentTypeSchema>
 </file>
 
-<file path=customXml/item2.xml><?xml version="1.0" encoding="utf-8"?>
-<p:properties xmlns:p="http://schemas.microsoft.com/office/2006/metadata/properties" xmlns:xsi="http://www.w3.org/2001/XMLSchema-instance" xmlns:pc="http://schemas.microsoft.com/office/infopath/2007/PartnerControls">
-  <documentManagement/>
-</p:properties>
-</file>
-
 <file path=customXml/item3.xml><?xml version="1.0" encoding="utf-8"?>
 <?mso-contentType ?>
 <FormTemplates xmlns="http://schemas.microsoft.com/sharepoint/v3/contenttype/forms">
@@ -12841,6 +12897,23 @@
 </file>
 
 <file path=customXml/itemProps1.xml><?xml version="1.0" encoding="utf-8"?>
+<ds:datastoreItem xmlns:ds="http://schemas.openxmlformats.org/officeDocument/2006/customXml" ds:itemID="{2B3A2521-C968-4BB8-80B3-61F0049BDE86}">
+  <ds:schemaRefs>
+    <ds:schemaRef ds:uri="http://schemas.microsoft.com/office/infopath/2007/PartnerControls"/>
+    <ds:schemaRef ds:uri="http://purl.org/dc/elements/1.1/"/>
+    <ds:schemaRef ds:uri="http://schemas.microsoft.com/office/2006/metadata/properties"/>
+    <ds:schemaRef ds:uri="0e503f2a-cab1-4c45-91d3-ac7b1ae47bc0"/>
+    <ds:schemaRef ds:uri="http://schemas.microsoft.com/office/2006/documentManagement/types"/>
+    <ds:schemaRef ds:uri="http://purl.org/dc/terms/"/>
+    <ds:schemaRef ds:uri="http://schemas.openxmlformats.org/package/2006/metadata/core-properties"/>
+    <ds:schemaRef ds:uri="http://purl.org/dc/dcmitype/"/>
+    <ds:schemaRef ds:uri="36d15805-55ee-4528-8ca3-5f15fb64af31"/>
+    <ds:schemaRef ds:uri="http://www.w3.org/XML/1998/namespace"/>
+  </ds:schemaRefs>
+</ds:datastoreItem>
+</file>
+
+<file path=customXml/itemProps2.xml><?xml version="1.0" encoding="utf-8"?>
 <ds:datastoreItem xmlns:ds="http://schemas.openxmlformats.org/officeDocument/2006/customXml" ds:itemID="{64551E2F-068A-4844-AC8D-BA6A9C471F36}">
   <ds:schemaRefs>
     <ds:schemaRef ds:uri="0e503f2a-cab1-4c45-91d3-ac7b1ae47bc0"/>
@@ -12859,23 +12932,6 @@
 </ds:datastoreItem>
 </file>
 
-<file path=customXml/itemProps2.xml><?xml version="1.0" encoding="utf-8"?>
-<ds:datastoreItem xmlns:ds="http://schemas.openxmlformats.org/officeDocument/2006/customXml" ds:itemID="{2B3A2521-C968-4BB8-80B3-61F0049BDE86}">
-  <ds:schemaRefs>
-    <ds:schemaRef ds:uri="http://schemas.microsoft.com/office/infopath/2007/PartnerControls"/>
-    <ds:schemaRef ds:uri="http://purl.org/dc/elements/1.1/"/>
-    <ds:schemaRef ds:uri="http://schemas.microsoft.com/office/2006/metadata/properties"/>
-    <ds:schemaRef ds:uri="0e503f2a-cab1-4c45-91d3-ac7b1ae47bc0"/>
-    <ds:schemaRef ds:uri="http://schemas.microsoft.com/office/2006/documentManagement/types"/>
-    <ds:schemaRef ds:uri="http://purl.org/dc/terms/"/>
-    <ds:schemaRef ds:uri="http://schemas.openxmlformats.org/package/2006/metadata/core-properties"/>
-    <ds:schemaRef ds:uri="http://purl.org/dc/dcmitype/"/>
-    <ds:schemaRef ds:uri="36d15805-55ee-4528-8ca3-5f15fb64af31"/>
-    <ds:schemaRef ds:uri="http://www.w3.org/XML/1998/namespace"/>
-  </ds:schemaRefs>
-</ds:datastoreItem>
-</file>
-
 <file path=customXml/itemProps3.xml><?xml version="1.0" encoding="utf-8"?>
 <ds:datastoreItem xmlns:ds="http://schemas.openxmlformats.org/officeDocument/2006/customXml" ds:itemID="{1CED243F-9546-4D11-B7E1-823DC6807876}">
   <ds:schemaRefs>

</xml_diff>